<commit_message>
Container Apps Up & Running - Ready !
Container Apps Up & Running - Ready !
</commit_message>
<xml_diff>
--- a/AllTogetherApp/Assets/Dapr on Azure Container Apps.pptx
+++ b/AllTogetherApp/Assets/Dapr on Azure Container Apps.pptx
@@ -3369,8 +3369,8 @@
         </p:blipFill>
         <p:spPr>
           <a:xfrm>
-            <a:off x="1195321" y="1735780"/>
-            <a:ext cx="1657061" cy="1526863"/>
+            <a:off x="333658" y="2355490"/>
+            <a:ext cx="1238636" cy="1141314"/>
           </a:xfrm>
           <a:prstGeom prst="rect">
             <a:avLst/>
@@ -3406,7 +3406,7 @@
         </p:blipFill>
         <p:spPr bwMode="auto">
           <a:xfrm>
-            <a:off x="966876" y="711771"/>
+            <a:off x="0" y="1046142"/>
             <a:ext cx="1950493" cy="1024009"/>
           </a:xfrm>
           <a:prstGeom prst="rect">
@@ -3426,10 +3426,55 @@
       </p:pic>
       <p:pic>
         <p:nvPicPr>
-          <p:cNvPr id="3" name="Picture 2">
-            <a:extLst>
-              <a:ext uri="{FF2B5EF4-FFF2-40B4-BE49-F238E27FC236}">
-                <a16:creationId xmlns:a16="http://schemas.microsoft.com/office/drawing/2014/main" id="{0342EC92-B962-4B0F-8C9C-7B48C349090D}"/>
+          <p:cNvPr id="1026" name="Picture 2" descr="Web App for Containers - OMGDebugging!!!">
+            <a:extLst>
+              <a:ext uri="{FF2B5EF4-FFF2-40B4-BE49-F238E27FC236}">
+                <a16:creationId xmlns:a16="http://schemas.microsoft.com/office/drawing/2014/main" id="{F1D704B7-A5F8-4E8B-9DB4-278B7EE9D766}"/>
+              </a:ext>
+            </a:extLst>
+          </p:cNvPr>
+          <p:cNvPicPr>
+            <a:picLocks noChangeAspect="1" noChangeArrowheads="1"/>
+          </p:cNvPicPr>
+          <p:nvPr/>
+        </p:nvPicPr>
+        <p:blipFill rotWithShape="1">
+          <a:blip r:embed="rId4">
+            <a:extLst>
+              <a:ext uri="{28A0092B-C50C-407E-A947-70E740481C1C}">
+                <a14:useLocalDpi xmlns:a14="http://schemas.microsoft.com/office/drawing/2010/main" val="0"/>
+              </a:ext>
+            </a:extLst>
+          </a:blip>
+          <a:srcRect l="13640" r="12407"/>
+          <a:stretch/>
+        </p:blipFill>
+        <p:spPr bwMode="auto">
+          <a:xfrm>
+            <a:off x="293426" y="3710415"/>
+            <a:ext cx="1487607" cy="1057692"/>
+          </a:xfrm>
+          <a:prstGeom prst="rect">
+            <a:avLst/>
+          </a:prstGeom>
+          <a:noFill/>
+          <a:extLst>
+            <a:ext uri="{909E8E84-426E-40DD-AFC4-6F175D3DCCD1}">
+              <a14:hiddenFill xmlns:a14="http://schemas.microsoft.com/office/drawing/2010/main">
+                <a:solidFill>
+                  <a:srgbClr val="FFFFFF"/>
+                </a:solidFill>
+              </a14:hiddenFill>
+            </a:ext>
+          </a:extLst>
+        </p:spPr>
+      </p:pic>
+      <p:pic>
+        <p:nvPicPr>
+          <p:cNvPr id="6" name="Picture 5" descr="Diagram&#10;&#10;Description automatically generated">
+            <a:extLst>
+              <a:ext uri="{FF2B5EF4-FFF2-40B4-BE49-F238E27FC236}">
+                <a16:creationId xmlns:a16="http://schemas.microsoft.com/office/drawing/2014/main" id="{AD01F39F-CB30-42AB-ACFC-1565700E2943}"/>
               </a:ext>
             </a:extLst>
           </p:cNvPr>
@@ -3439,15 +3484,21 @@
           <p:nvPr/>
         </p:nvPicPr>
         <p:blipFill>
-          <a:blip r:embed="rId4"/>
+          <a:blip r:embed="rId5">
+            <a:extLst>
+              <a:ext uri="{28A0092B-C50C-407E-A947-70E740481C1C}">
+                <a14:useLocalDpi xmlns:a14="http://schemas.microsoft.com/office/drawing/2010/main" val="0"/>
+              </a:ext>
+            </a:extLst>
+          </a:blip>
           <a:stretch>
             <a:fillRect/>
           </a:stretch>
         </p:blipFill>
         <p:spPr>
           <a:xfrm>
-            <a:off x="3943049" y="1552313"/>
-            <a:ext cx="4305901" cy="3753374"/>
+            <a:off x="3902549" y="829005"/>
+            <a:ext cx="6229350" cy="4867275"/>
           </a:xfrm>
           <a:prstGeom prst="rect">
             <a:avLst/>

</xml_diff>